<commit_message>
Project #3 Vlad Nikitin
</commit_message>
<xml_diff>
--- a/projects/final-project/01-lightning-talk/Nikitin_Final_Project_Part 1.pptx
+++ b/projects/final-project/01-lightning-talk/Nikitin_Final_Project_Part 1.pptx
@@ -4,8 +4,11 @@
   <p:sldMasterIdLst>
     <p:sldMasterId id="2147483648" r:id="rId1"/>
   </p:sldMasterIdLst>
+  <p:notesMasterIdLst>
+    <p:notesMasterId r:id="rId6"/>
+  </p:notesMasterIdLst>
   <p:sldIdLst>
-    <p:sldId id="256" r:id="rId2"/>
+    <p:sldId id="261" r:id="rId2"/>
     <p:sldId id="258" r:id="rId3"/>
     <p:sldId id="259" r:id="rId4"/>
     <p:sldId id="257" r:id="rId5"/>
@@ -107,7 +110,362 @@
       </a:defRPr>
     </a:lvl9pPr>
   </p:defaultTextStyle>
+  <p:extLst>
+    <p:ext uri="{EFAFB233-063F-42B5-8137-9DF3F51BA10A}">
+      <p15:sldGuideLst xmlns:p15="http://schemas.microsoft.com/office/powerpoint/2012/main"/>
+    </p:ext>
+  </p:extLst>
 </p:presentation>
+</file>
+
+<file path=ppt/notesMasters/notesMaster1.xml><?xml version="1.0" encoding="utf-8"?>
+<p:notesMaster xmlns:a="http://schemas.openxmlformats.org/drawingml/2006/main" xmlns:r="http://schemas.openxmlformats.org/officeDocument/2006/relationships" xmlns:p="http://schemas.openxmlformats.org/presentationml/2006/main">
+  <p:cSld>
+    <p:bg>
+      <p:bgRef idx="1001">
+        <a:schemeClr val="bg1"/>
+      </p:bgRef>
+    </p:bg>
+    <p:spTree>
+      <p:nvGrpSpPr>
+        <p:cNvPr id="1" name=""/>
+        <p:cNvGrpSpPr/>
+        <p:nvPr/>
+      </p:nvGrpSpPr>
+      <p:grpSpPr>
+        <a:xfrm>
+          <a:off x="0" y="0"/>
+          <a:ext cx="0" cy="0"/>
+          <a:chOff x="0" y="0"/>
+          <a:chExt cx="0" cy="0"/>
+        </a:xfrm>
+      </p:grpSpPr>
+      <p:sp>
+        <p:nvSpPr>
+          <p:cNvPr id="2" name="Header Placeholder 1"/>
+          <p:cNvSpPr>
+            <a:spLocks noGrp="1"/>
+          </p:cNvSpPr>
+          <p:nvPr>
+            <p:ph type="hdr" sz="quarter"/>
+          </p:nvPr>
+        </p:nvSpPr>
+        <p:spPr>
+          <a:xfrm>
+            <a:off x="0" y="0"/>
+            <a:ext cx="2971800" cy="458788"/>
+          </a:xfrm>
+          <a:prstGeom prst="rect">
+            <a:avLst/>
+          </a:prstGeom>
+        </p:spPr>
+        <p:txBody>
+          <a:bodyPr vert="horz" lIns="91440" tIns="45720" rIns="91440" bIns="45720" rtlCol="0"/>
+          <a:lstStyle>
+            <a:lvl1pPr algn="l">
+              <a:defRPr sz="1200"/>
+            </a:lvl1pPr>
+          </a:lstStyle>
+          <a:p>
+            <a:endParaRPr lang="en-US"/>
+          </a:p>
+        </p:txBody>
+      </p:sp>
+      <p:sp>
+        <p:nvSpPr>
+          <p:cNvPr id="3" name="Date Placeholder 2"/>
+          <p:cNvSpPr>
+            <a:spLocks noGrp="1"/>
+          </p:cNvSpPr>
+          <p:nvPr>
+            <p:ph type="dt" idx="1"/>
+          </p:nvPr>
+        </p:nvSpPr>
+        <p:spPr>
+          <a:xfrm>
+            <a:off x="3884613" y="0"/>
+            <a:ext cx="2971800" cy="458788"/>
+          </a:xfrm>
+          <a:prstGeom prst="rect">
+            <a:avLst/>
+          </a:prstGeom>
+        </p:spPr>
+        <p:txBody>
+          <a:bodyPr vert="horz" lIns="91440" tIns="45720" rIns="91440" bIns="45720" rtlCol="0"/>
+          <a:lstStyle>
+            <a:lvl1pPr algn="r">
+              <a:defRPr sz="1200"/>
+            </a:lvl1pPr>
+          </a:lstStyle>
+          <a:p>
+            <a:fld id="{ABC501B7-1E47-0146-A645-0FEEF2404142}" type="datetimeFigureOut">
+              <a:rPr lang="en-US" smtClean="0"/>
+              <a:t>11/29/17</a:t>
+            </a:fld>
+            <a:endParaRPr lang="en-US"/>
+          </a:p>
+        </p:txBody>
+      </p:sp>
+      <p:sp>
+        <p:nvSpPr>
+          <p:cNvPr id="4" name="Slide Image Placeholder 3"/>
+          <p:cNvSpPr>
+            <a:spLocks noGrp="1" noRot="1" noChangeAspect="1"/>
+          </p:cNvSpPr>
+          <p:nvPr>
+            <p:ph type="sldImg" idx="2"/>
+          </p:nvPr>
+        </p:nvSpPr>
+        <p:spPr>
+          <a:xfrm>
+            <a:off x="685800" y="1143000"/>
+            <a:ext cx="5486400" cy="3086100"/>
+          </a:xfrm>
+          <a:prstGeom prst="rect">
+            <a:avLst/>
+          </a:prstGeom>
+          <a:noFill/>
+          <a:ln w="12700">
+            <a:solidFill>
+              <a:prstClr val="black"/>
+            </a:solidFill>
+          </a:ln>
+        </p:spPr>
+        <p:txBody>
+          <a:bodyPr vert="horz" lIns="91440" tIns="45720" rIns="91440" bIns="45720" rtlCol="0" anchor="ctr"/>
+          <a:lstStyle/>
+          <a:p>
+            <a:endParaRPr lang="en-US"/>
+          </a:p>
+        </p:txBody>
+      </p:sp>
+      <p:sp>
+        <p:nvSpPr>
+          <p:cNvPr id="5" name="Notes Placeholder 4"/>
+          <p:cNvSpPr>
+            <a:spLocks noGrp="1"/>
+          </p:cNvSpPr>
+          <p:nvPr>
+            <p:ph type="body" sz="quarter" idx="3"/>
+          </p:nvPr>
+        </p:nvSpPr>
+        <p:spPr>
+          <a:xfrm>
+            <a:off x="685800" y="4400550"/>
+            <a:ext cx="5486400" cy="3600450"/>
+          </a:xfrm>
+          <a:prstGeom prst="rect">
+            <a:avLst/>
+          </a:prstGeom>
+        </p:spPr>
+        <p:txBody>
+          <a:bodyPr vert="horz" lIns="91440" tIns="45720" rIns="91440" bIns="45720" rtlCol="0"/>
+          <a:lstStyle/>
+          <a:p>
+            <a:pPr lvl="0"/>
+            <a:r>
+              <a:rPr lang="en-US" smtClean="0"/>
+              <a:t>Click to edit Master text styles</a:t>
+            </a:r>
+          </a:p>
+          <a:p>
+            <a:pPr lvl="1"/>
+            <a:r>
+              <a:rPr lang="en-US" smtClean="0"/>
+              <a:t>Second level</a:t>
+            </a:r>
+          </a:p>
+          <a:p>
+            <a:pPr lvl="2"/>
+            <a:r>
+              <a:rPr lang="en-US" smtClean="0"/>
+              <a:t>Third level</a:t>
+            </a:r>
+          </a:p>
+          <a:p>
+            <a:pPr lvl="3"/>
+            <a:r>
+              <a:rPr lang="en-US" smtClean="0"/>
+              <a:t>Fourth level</a:t>
+            </a:r>
+          </a:p>
+          <a:p>
+            <a:pPr lvl="4"/>
+            <a:r>
+              <a:rPr lang="en-US" smtClean="0"/>
+              <a:t>Fifth level</a:t>
+            </a:r>
+            <a:endParaRPr lang="en-US"/>
+          </a:p>
+        </p:txBody>
+      </p:sp>
+      <p:sp>
+        <p:nvSpPr>
+          <p:cNvPr id="6" name="Footer Placeholder 5"/>
+          <p:cNvSpPr>
+            <a:spLocks noGrp="1"/>
+          </p:cNvSpPr>
+          <p:nvPr>
+            <p:ph type="ftr" sz="quarter" idx="4"/>
+          </p:nvPr>
+        </p:nvSpPr>
+        <p:spPr>
+          <a:xfrm>
+            <a:off x="0" y="8685213"/>
+            <a:ext cx="2971800" cy="458787"/>
+          </a:xfrm>
+          <a:prstGeom prst="rect">
+            <a:avLst/>
+          </a:prstGeom>
+        </p:spPr>
+        <p:txBody>
+          <a:bodyPr vert="horz" lIns="91440" tIns="45720" rIns="91440" bIns="45720" rtlCol="0" anchor="b"/>
+          <a:lstStyle>
+            <a:lvl1pPr algn="l">
+              <a:defRPr sz="1200"/>
+            </a:lvl1pPr>
+          </a:lstStyle>
+          <a:p>
+            <a:endParaRPr lang="en-US"/>
+          </a:p>
+        </p:txBody>
+      </p:sp>
+      <p:sp>
+        <p:nvSpPr>
+          <p:cNvPr id="7" name="Slide Number Placeholder 6"/>
+          <p:cNvSpPr>
+            <a:spLocks noGrp="1"/>
+          </p:cNvSpPr>
+          <p:nvPr>
+            <p:ph type="sldNum" sz="quarter" idx="5"/>
+          </p:nvPr>
+        </p:nvSpPr>
+        <p:spPr>
+          <a:xfrm>
+            <a:off x="3884613" y="8685213"/>
+            <a:ext cx="2971800" cy="458787"/>
+          </a:xfrm>
+          <a:prstGeom prst="rect">
+            <a:avLst/>
+          </a:prstGeom>
+        </p:spPr>
+        <p:txBody>
+          <a:bodyPr vert="horz" lIns="91440" tIns="45720" rIns="91440" bIns="45720" rtlCol="0" anchor="b"/>
+          <a:lstStyle>
+            <a:lvl1pPr algn="r">
+              <a:defRPr sz="1200"/>
+            </a:lvl1pPr>
+          </a:lstStyle>
+          <a:p>
+            <a:fld id="{C0662B71-203E-2A42-AEEB-8F80D086AB37}" type="slidenum">
+              <a:rPr lang="en-US" smtClean="0"/>
+              <a:t>‹#›</a:t>
+            </a:fld>
+            <a:endParaRPr lang="en-US"/>
+          </a:p>
+        </p:txBody>
+      </p:sp>
+    </p:spTree>
+    <p:extLst>
+      <p:ext uri="{BB962C8B-B14F-4D97-AF65-F5344CB8AC3E}">
+        <p14:creationId xmlns:p14="http://schemas.microsoft.com/office/powerpoint/2010/main" val="2088809778"/>
+      </p:ext>
+    </p:extLst>
+  </p:cSld>
+  <p:clrMap bg1="lt1" tx1="dk1" bg2="lt2" tx2="dk2" accent1="accent1" accent2="accent2" accent3="accent3" accent4="accent4" accent5="accent5" accent6="accent6" hlink="hlink" folHlink="folHlink"/>
+  <p:notesStyle>
+    <a:lvl1pPr marL="0" algn="l" defTabSz="914400" rtl="0" eaLnBrk="1" latinLnBrk="0" hangingPunct="1">
+      <a:defRPr sz="1200" kern="1200">
+        <a:solidFill>
+          <a:schemeClr val="tx1"/>
+        </a:solidFill>
+        <a:latin typeface="+mn-lt"/>
+        <a:ea typeface="+mn-ea"/>
+        <a:cs typeface="+mn-cs"/>
+      </a:defRPr>
+    </a:lvl1pPr>
+    <a:lvl2pPr marL="457200" algn="l" defTabSz="914400" rtl="0" eaLnBrk="1" latinLnBrk="0" hangingPunct="1">
+      <a:defRPr sz="1200" kern="1200">
+        <a:solidFill>
+          <a:schemeClr val="tx1"/>
+        </a:solidFill>
+        <a:latin typeface="+mn-lt"/>
+        <a:ea typeface="+mn-ea"/>
+        <a:cs typeface="+mn-cs"/>
+      </a:defRPr>
+    </a:lvl2pPr>
+    <a:lvl3pPr marL="914400" algn="l" defTabSz="914400" rtl="0" eaLnBrk="1" latinLnBrk="0" hangingPunct="1">
+      <a:defRPr sz="1200" kern="1200">
+        <a:solidFill>
+          <a:schemeClr val="tx1"/>
+        </a:solidFill>
+        <a:latin typeface="+mn-lt"/>
+        <a:ea typeface="+mn-ea"/>
+        <a:cs typeface="+mn-cs"/>
+      </a:defRPr>
+    </a:lvl3pPr>
+    <a:lvl4pPr marL="1371600" algn="l" defTabSz="914400" rtl="0" eaLnBrk="1" latinLnBrk="0" hangingPunct="1">
+      <a:defRPr sz="1200" kern="1200">
+        <a:solidFill>
+          <a:schemeClr val="tx1"/>
+        </a:solidFill>
+        <a:latin typeface="+mn-lt"/>
+        <a:ea typeface="+mn-ea"/>
+        <a:cs typeface="+mn-cs"/>
+      </a:defRPr>
+    </a:lvl4pPr>
+    <a:lvl5pPr marL="1828800" algn="l" defTabSz="914400" rtl="0" eaLnBrk="1" latinLnBrk="0" hangingPunct="1">
+      <a:defRPr sz="1200" kern="1200">
+        <a:solidFill>
+          <a:schemeClr val="tx1"/>
+        </a:solidFill>
+        <a:latin typeface="+mn-lt"/>
+        <a:ea typeface="+mn-ea"/>
+        <a:cs typeface="+mn-cs"/>
+      </a:defRPr>
+    </a:lvl5pPr>
+    <a:lvl6pPr marL="2286000" algn="l" defTabSz="914400" rtl="0" eaLnBrk="1" latinLnBrk="0" hangingPunct="1">
+      <a:defRPr sz="1200" kern="1200">
+        <a:solidFill>
+          <a:schemeClr val="tx1"/>
+        </a:solidFill>
+        <a:latin typeface="+mn-lt"/>
+        <a:ea typeface="+mn-ea"/>
+        <a:cs typeface="+mn-cs"/>
+      </a:defRPr>
+    </a:lvl6pPr>
+    <a:lvl7pPr marL="2743200" algn="l" defTabSz="914400" rtl="0" eaLnBrk="1" latinLnBrk="0" hangingPunct="1">
+      <a:defRPr sz="1200" kern="1200">
+        <a:solidFill>
+          <a:schemeClr val="tx1"/>
+        </a:solidFill>
+        <a:latin typeface="+mn-lt"/>
+        <a:ea typeface="+mn-ea"/>
+        <a:cs typeface="+mn-cs"/>
+      </a:defRPr>
+    </a:lvl7pPr>
+    <a:lvl8pPr marL="3200400" algn="l" defTabSz="914400" rtl="0" eaLnBrk="1" latinLnBrk="0" hangingPunct="1">
+      <a:defRPr sz="1200" kern="1200">
+        <a:solidFill>
+          <a:schemeClr val="tx1"/>
+        </a:solidFill>
+        <a:latin typeface="+mn-lt"/>
+        <a:ea typeface="+mn-ea"/>
+        <a:cs typeface="+mn-cs"/>
+      </a:defRPr>
+    </a:lvl8pPr>
+    <a:lvl9pPr marL="3657600" algn="l" defTabSz="914400" rtl="0" eaLnBrk="1" latinLnBrk="0" hangingPunct="1">
+      <a:defRPr sz="1200" kern="1200">
+        <a:solidFill>
+          <a:schemeClr val="tx1"/>
+        </a:solidFill>
+        <a:latin typeface="+mn-lt"/>
+        <a:ea typeface="+mn-ea"/>
+        <a:cs typeface="+mn-cs"/>
+      </a:defRPr>
+    </a:lvl9pPr>
+  </p:notesStyle>
+</p:notesMaster>
 </file>
 
 <file path=ppt/slideLayouts/slideLayout1.xml><?xml version="1.0" encoding="utf-8"?>
@@ -241,7 +599,7 @@
           <a:p>
             <a:fld id="{732D20E1-968C-8F4D-961E-61E0ED1DCD74}" type="datetimeFigureOut">
               <a:rPr lang="en-US" smtClean="0"/>
-              <a:t>11/28/17</a:t>
+              <a:t>11/29/17</a:t>
             </a:fld>
             <a:endParaRPr lang="en-US"/>
           </a:p>
@@ -411,7 +769,7 @@
           <a:p>
             <a:fld id="{732D20E1-968C-8F4D-961E-61E0ED1DCD74}" type="datetimeFigureOut">
               <a:rPr lang="en-US" smtClean="0"/>
-              <a:t>11/28/17</a:t>
+              <a:t>11/29/17</a:t>
             </a:fld>
             <a:endParaRPr lang="en-US"/>
           </a:p>
@@ -591,7 +949,7 @@
           <a:p>
             <a:fld id="{732D20E1-968C-8F4D-961E-61E0ED1DCD74}" type="datetimeFigureOut">
               <a:rPr lang="en-US" smtClean="0"/>
-              <a:t>11/28/17</a:t>
+              <a:t>11/29/17</a:t>
             </a:fld>
             <a:endParaRPr lang="en-US"/>
           </a:p>
@@ -761,7 +1119,7 @@
           <a:p>
             <a:fld id="{732D20E1-968C-8F4D-961E-61E0ED1DCD74}" type="datetimeFigureOut">
               <a:rPr lang="en-US" smtClean="0"/>
-              <a:t>11/28/17</a:t>
+              <a:t>11/29/17</a:t>
             </a:fld>
             <a:endParaRPr lang="en-US"/>
           </a:p>
@@ -1007,7 +1365,7 @@
           <a:p>
             <a:fld id="{732D20E1-968C-8F4D-961E-61E0ED1DCD74}" type="datetimeFigureOut">
               <a:rPr lang="en-US" smtClean="0"/>
-              <a:t>11/28/17</a:t>
+              <a:t>11/29/17</a:t>
             </a:fld>
             <a:endParaRPr lang="en-US"/>
           </a:p>
@@ -1239,7 +1597,7 @@
           <a:p>
             <a:fld id="{732D20E1-968C-8F4D-961E-61E0ED1DCD74}" type="datetimeFigureOut">
               <a:rPr lang="en-US" smtClean="0"/>
-              <a:t>11/28/17</a:t>
+              <a:t>11/29/17</a:t>
             </a:fld>
             <a:endParaRPr lang="en-US"/>
           </a:p>
@@ -1606,7 +1964,7 @@
           <a:p>
             <a:fld id="{732D20E1-968C-8F4D-961E-61E0ED1DCD74}" type="datetimeFigureOut">
               <a:rPr lang="en-US" smtClean="0"/>
-              <a:t>11/28/17</a:t>
+              <a:t>11/29/17</a:t>
             </a:fld>
             <a:endParaRPr lang="en-US"/>
           </a:p>
@@ -1724,7 +2082,7 @@
           <a:p>
             <a:fld id="{732D20E1-968C-8F4D-961E-61E0ED1DCD74}" type="datetimeFigureOut">
               <a:rPr lang="en-US" smtClean="0"/>
-              <a:t>11/28/17</a:t>
+              <a:t>11/29/17</a:t>
             </a:fld>
             <a:endParaRPr lang="en-US"/>
           </a:p>
@@ -1819,7 +2177,7 @@
           <a:p>
             <a:fld id="{732D20E1-968C-8F4D-961E-61E0ED1DCD74}" type="datetimeFigureOut">
               <a:rPr lang="en-US" smtClean="0"/>
-              <a:t>11/28/17</a:t>
+              <a:t>11/29/17</a:t>
             </a:fld>
             <a:endParaRPr lang="en-US"/>
           </a:p>
@@ -2096,7 +2454,7 @@
           <a:p>
             <a:fld id="{732D20E1-968C-8F4D-961E-61E0ED1DCD74}" type="datetimeFigureOut">
               <a:rPr lang="en-US" smtClean="0"/>
-              <a:t>11/28/17</a:t>
+              <a:t>11/29/17</a:t>
             </a:fld>
             <a:endParaRPr lang="en-US"/>
           </a:p>
@@ -2349,7 +2707,7 @@
           <a:p>
             <a:fld id="{732D20E1-968C-8F4D-961E-61E0ED1DCD74}" type="datetimeFigureOut">
               <a:rPr lang="en-US" smtClean="0"/>
-              <a:t>11/28/17</a:t>
+              <a:t>11/29/17</a:t>
             </a:fld>
             <a:endParaRPr lang="en-US"/>
           </a:p>
@@ -2562,7 +2920,7 @@
           <a:p>
             <a:fld id="{732D20E1-968C-8F4D-961E-61E0ED1DCD74}" type="datetimeFigureOut">
               <a:rPr lang="en-US" smtClean="0"/>
-              <a:t>11/28/17</a:t>
+              <a:t>11/29/17</a:t>
             </a:fld>
             <a:endParaRPr lang="en-US"/>
           </a:p>
@@ -2967,298 +3325,309 @@
           <a:chExt cx="0" cy="0"/>
         </a:xfrm>
       </p:grpSpPr>
-      <p:sp>
-        <p:nvSpPr>
-          <p:cNvPr id="2" name="Title 1"/>
-          <p:cNvSpPr>
-            <a:spLocks noGrp="1"/>
-          </p:cNvSpPr>
-          <p:nvPr>
-            <p:ph type="ctrTitle"/>
-          </p:nvPr>
-        </p:nvSpPr>
+      <p:pic>
+        <p:nvPicPr>
+          <p:cNvPr id="2" name="Picture 1"/>
+          <p:cNvPicPr>
+            <a:picLocks noChangeAspect="1"/>
+          </p:cNvPicPr>
+          <p:nvPr/>
+        </p:nvPicPr>
+        <p:blipFill>
+          <a:blip r:embed="rId2" cstate="print">
+            <a:extLst>
+              <a:ext uri="{28A0092B-C50C-407E-A947-70E740481C1C}">
+                <a14:useLocalDpi xmlns:a14="http://schemas.microsoft.com/office/drawing/2010/main" val="0"/>
+              </a:ext>
+            </a:extLst>
+          </a:blip>
+          <a:stretch>
+            <a:fillRect/>
+          </a:stretch>
+        </p:blipFill>
         <p:spPr>
           <a:xfrm>
-            <a:off x="331808" y="324089"/>
-            <a:ext cx="11509093" cy="5069714"/>
+            <a:off x="-115502" y="1716757"/>
+            <a:ext cx="3174318" cy="3445051"/>
           </a:xfrm>
+          <a:prstGeom prst="rect">
+            <a:avLst/>
+          </a:prstGeom>
         </p:spPr>
-        <p:txBody>
-          <a:bodyPr>
-            <a:normAutofit fontScale="90000"/>
-          </a:bodyPr>
-          <a:lstStyle/>
-          <a:p>
-            <a:pPr algn="l"/>
-            <a:r>
-              <a:rPr lang="en-US" sz="1200" dirty="0"/>
-              <a:t/>
-            </a:r>
-            <a:br>
-              <a:rPr lang="en-US" sz="1200" dirty="0"/>
-            </a:br>
-            <a:r>
-              <a:rPr lang="en-US" sz="1200" dirty="0"/>
-              <a:t/>
-            </a:r>
-            <a:br>
-              <a:rPr lang="en-US" sz="1200" dirty="0"/>
-            </a:br>
-            <a:r>
-              <a:rPr lang="en-US" sz="1200" dirty="0"/>
-              <a:t> </a:t>
-            </a:r>
-            <a:r>
-              <a:rPr lang="en-US" sz="2000" b="1" dirty="0" smtClean="0"/>
-              <a:t>Final Project </a:t>
-            </a:r>
-            <a:br>
-              <a:rPr lang="en-US" sz="2000" b="1" dirty="0" smtClean="0"/>
-            </a:br>
-            <a:r>
-              <a:rPr lang="en-US" sz="2000" dirty="0" smtClean="0"/>
-              <a:t/>
-            </a:r>
-            <a:br>
-              <a:rPr lang="en-US" sz="2000" dirty="0" smtClean="0"/>
-            </a:br>
-            <a:r>
-              <a:rPr lang="en-US" sz="2000" dirty="0" smtClean="0"/>
-              <a:t>Chicago </a:t>
-            </a:r>
-            <a:r>
-              <a:rPr lang="en-US" sz="2000" dirty="0"/>
-              <a:t>violent crime rates have been in the news lately and none of these news were good. Both national and local news outlets have published numerous articles highlighting the alarmingly high numbers of violent crimes in the city. </a:t>
-            </a:r>
-            <a:br>
-              <a:rPr lang="en-US" sz="2000" dirty="0"/>
-            </a:br>
-            <a:r>
-              <a:rPr lang="en-US" sz="2000" dirty="0"/>
-              <a:t>In preparation to the upcoming meeting with a very well-known real estate developer, I</a:t>
-            </a:r>
-            <a:r>
-              <a:rPr lang="en-US" sz="2000" dirty="0" smtClean="0"/>
-              <a:t> will </a:t>
-            </a:r>
-            <a:r>
-              <a:rPr lang="en-US" sz="2000" dirty="0"/>
-              <a:t>to provide honest, unbiased assessment of Chicago crime rates. This is </a:t>
-            </a:r>
-            <a:r>
-              <a:rPr lang="en-US" sz="2000" dirty="0" smtClean="0"/>
-              <a:t>my </a:t>
-            </a:r>
-            <a:r>
-              <a:rPr lang="en-US" sz="2000" dirty="0"/>
-              <a:t>opportunity to tell </a:t>
-            </a:r>
-            <a:r>
-              <a:rPr lang="en-US" sz="2000" dirty="0" smtClean="0"/>
-              <a:t>how </a:t>
-            </a:r>
-            <a:r>
-              <a:rPr lang="en-US" sz="2000" dirty="0"/>
-              <a:t>dangerous (or not) Chicago has become in the last </a:t>
-            </a:r>
-            <a:r>
-              <a:rPr lang="en-US" sz="2000" dirty="0" smtClean="0"/>
-              <a:t>year. </a:t>
-            </a:r>
-            <a:r>
-              <a:rPr lang="en-US" sz="2000" dirty="0"/>
-              <a:t>You </a:t>
-            </a:r>
-            <a:r>
-              <a:rPr lang="en-US" sz="2000" b="1" dirty="0"/>
-              <a:t>may </a:t>
-            </a:r>
-            <a:r>
-              <a:rPr lang="en-US" sz="2000" dirty="0"/>
-              <a:t>want to consider highlighting </a:t>
-            </a:r>
-            <a:r>
-              <a:rPr lang="en-US" sz="2000" b="1" dirty="0"/>
-              <a:t>some </a:t>
-            </a:r>
-            <a:r>
-              <a:rPr lang="en-US" sz="2000" dirty="0"/>
-              <a:t>of the following: </a:t>
-            </a:r>
-            <a:r>
-              <a:rPr lang="en-US" sz="2000" dirty="0" smtClean="0"/>
-              <a:t/>
-            </a:r>
-            <a:br>
-              <a:rPr lang="en-US" sz="2000" dirty="0" smtClean="0"/>
-            </a:br>
-            <a:r>
-              <a:rPr lang="en-US" sz="2000" dirty="0"/>
-              <a:t/>
-            </a:r>
-            <a:br>
-              <a:rPr lang="en-US" sz="2000" dirty="0"/>
-            </a:br>
-            <a:r>
-              <a:rPr lang="en-US" sz="3100" b="1" i="1" dirty="0"/>
-              <a:t>The Problem</a:t>
-            </a:r>
-            <a:r>
-              <a:rPr lang="en-US" sz="3100" b="1" dirty="0"/>
-              <a:t>:</a:t>
-            </a:r>
-            <a:r>
-              <a:rPr lang="en-US" sz="1800" dirty="0"/>
-              <a:t> </a:t>
-            </a:r>
-            <a:r>
-              <a:rPr lang="en-US" sz="2000" dirty="0" smtClean="0"/>
-              <a:t/>
-            </a:r>
-            <a:br>
-              <a:rPr lang="en-US" sz="2000" dirty="0" smtClean="0"/>
-            </a:br>
-            <a:r>
-              <a:rPr lang="en-US" sz="2000" dirty="0" smtClean="0"/>
-              <a:t>• </a:t>
-            </a:r>
-            <a:r>
-              <a:rPr lang="en-US" sz="2700" b="1" dirty="0"/>
-              <a:t>What are the historical Chicago crime trends? </a:t>
-            </a:r>
-            <a:r>
-              <a:rPr lang="en-US" sz="2000" dirty="0" smtClean="0"/>
-              <a:t/>
-            </a:r>
-            <a:br>
-              <a:rPr lang="en-US" sz="2000" dirty="0" smtClean="0"/>
-            </a:br>
-            <a:r>
-              <a:rPr lang="en-US" sz="2000" dirty="0"/>
-              <a:t/>
-            </a:r>
-            <a:br>
-              <a:rPr lang="en-US" sz="2000" dirty="0"/>
-            </a:br>
-            <a:r>
-              <a:rPr lang="en-US" sz="2000" dirty="0" smtClean="0"/>
-              <a:t>o </a:t>
-            </a:r>
-            <a:r>
-              <a:rPr lang="en-US" sz="2000" dirty="0"/>
-              <a:t>How these trends compare with other large cities? </a:t>
-            </a:r>
-            <a:br>
-              <a:rPr lang="en-US" sz="2000" dirty="0"/>
-            </a:br>
-            <a:r>
-              <a:rPr lang="en-US" sz="2000" dirty="0"/>
-              <a:t>o Is there a seasonality aspect in the crime rates? </a:t>
-            </a:r>
-            <a:br>
-              <a:rPr lang="en-US" sz="2000" dirty="0"/>
-            </a:br>
-            <a:r>
-              <a:rPr lang="en-US" sz="2000" dirty="0"/>
-              <a:t>o Are there certain seasons / times of the day that are particularly affected? </a:t>
-            </a:r>
-            <a:br>
-              <a:rPr lang="en-US" sz="2000" dirty="0"/>
-            </a:br>
-            <a:r>
-              <a:rPr lang="en-US" sz="2000" dirty="0"/>
-              <a:t>o Do you see all crime rates growing in Chicago, or just certain types of crime? </a:t>
-            </a:r>
-            <a:r>
-              <a:rPr lang="en-US" sz="2000" dirty="0" smtClean="0"/>
-              <a:t/>
-            </a:r>
-            <a:br>
-              <a:rPr lang="en-US" sz="2000" dirty="0" smtClean="0"/>
-            </a:br>
-            <a:r>
-              <a:rPr lang="en-US" sz="2000" dirty="0"/>
-              <a:t/>
-            </a:r>
-            <a:br>
-              <a:rPr lang="en-US" sz="2000" dirty="0"/>
-            </a:br>
-            <a:r>
-              <a:rPr lang="en-US" sz="1800" b="1" i="1" dirty="0"/>
-              <a:t> </a:t>
-            </a:r>
-            <a:r>
-              <a:rPr lang="en-US" sz="3100" b="1" i="1" dirty="0"/>
-              <a:t>Hypotheses</a:t>
-            </a:r>
-            <a:r>
-              <a:rPr lang="en-US" sz="3100" dirty="0"/>
-              <a:t>: </a:t>
-            </a:r>
-            <a:r>
-              <a:rPr lang="en-US" sz="3100" dirty="0" smtClean="0"/>
-              <a:t>The </a:t>
-            </a:r>
-            <a:r>
-              <a:rPr lang="en-US" sz="3100" dirty="0" smtClean="0">
-                <a:latin typeface="+mn-lt"/>
-              </a:rPr>
-              <a:t>Chicago historical crime trend is positive. </a:t>
-            </a:r>
-            <a:r>
-              <a:rPr lang="en-US" sz="3100" dirty="0"/>
-              <a:t/>
-            </a:r>
-            <a:br>
-              <a:rPr lang="en-US" sz="3100" dirty="0"/>
-            </a:br>
-            <a:r>
-              <a:rPr lang="en-US" sz="2000" dirty="0"/>
-              <a:t/>
-            </a:r>
-            <a:br>
-              <a:rPr lang="en-US" sz="2000" dirty="0"/>
-            </a:br>
-            <a:r>
-              <a:rPr lang="en-US" sz="2000" dirty="0"/>
-              <a:t/>
-            </a:r>
-            <a:br>
-              <a:rPr lang="en-US" sz="2000" dirty="0"/>
-            </a:br>
-            <a:r>
-              <a:rPr lang="en-US" sz="2000" dirty="0"/>
-              <a:t/>
-            </a:r>
-            <a:br>
-              <a:rPr lang="en-US" sz="2000" dirty="0"/>
-            </a:br>
-            <a:endParaRPr lang="en-US" sz="2000" dirty="0"/>
-          </a:p>
-        </p:txBody>
-      </p:sp>
-      <p:sp>
-        <p:nvSpPr>
-          <p:cNvPr id="3" name="Subtitle 2"/>
-          <p:cNvSpPr>
-            <a:spLocks noGrp="1"/>
-          </p:cNvSpPr>
-          <p:nvPr>
-            <p:ph type="subTitle" idx="1"/>
-          </p:nvPr>
-        </p:nvSpPr>
+      </p:pic>
+      <p:pic>
+        <p:nvPicPr>
+          <p:cNvPr id="3" name="Picture 2"/>
+          <p:cNvPicPr>
+            <a:picLocks noChangeAspect="1"/>
+          </p:cNvPicPr>
+          <p:nvPr/>
+        </p:nvPicPr>
+        <p:blipFill>
+          <a:blip r:embed="rId3" cstate="print">
+            <a:extLst>
+              <a:ext uri="{28A0092B-C50C-407E-A947-70E740481C1C}">
+                <a14:useLocalDpi xmlns:a14="http://schemas.microsoft.com/office/drawing/2010/main" val="0"/>
+              </a:ext>
+            </a:extLst>
+          </a:blip>
+          <a:stretch>
+            <a:fillRect/>
+          </a:stretch>
+        </p:blipFill>
         <p:spPr>
           <a:xfrm>
-            <a:off x="598025" y="6504971"/>
-            <a:ext cx="9144000" cy="234387"/>
+            <a:off x="10131889" y="1391056"/>
+            <a:ext cx="2060111" cy="4120221"/>
           </a:xfrm>
+          <a:prstGeom prst="rect">
+            <a:avLst/>
+          </a:prstGeom>
         </p:spPr>
-        <p:txBody>
-          <a:bodyPr>
-            <a:normAutofit fontScale="55000" lnSpcReduction="20000"/>
+      </p:pic>
+      <p:pic>
+        <p:nvPicPr>
+          <p:cNvPr id="4" name="Picture 3"/>
+          <p:cNvPicPr>
+            <a:picLocks noChangeAspect="1"/>
+          </p:cNvPicPr>
+          <p:nvPr/>
+        </p:nvPicPr>
+        <p:blipFill>
+          <a:blip r:embed="rId4"/>
+          <a:stretch>
+            <a:fillRect/>
+          </a:stretch>
+        </p:blipFill>
+        <p:spPr>
+          <a:xfrm>
+            <a:off x="80510" y="83019"/>
+            <a:ext cx="1219048" cy="1047619"/>
+          </a:xfrm>
+          <a:prstGeom prst="rect">
+            <a:avLst/>
+          </a:prstGeom>
+        </p:spPr>
+      </p:pic>
+      <p:pic>
+        <p:nvPicPr>
+          <p:cNvPr id="5" name="Picture 4"/>
+          <p:cNvPicPr>
+            <a:picLocks noChangeAspect="1"/>
+          </p:cNvPicPr>
+          <p:nvPr/>
+        </p:nvPicPr>
+        <p:blipFill>
+          <a:blip r:embed="rId5"/>
+          <a:stretch>
+            <a:fillRect/>
+          </a:stretch>
+        </p:blipFill>
+        <p:spPr>
+          <a:xfrm>
+            <a:off x="10972694" y="5819650"/>
+            <a:ext cx="1219306" cy="1042506"/>
+          </a:xfrm>
+          <a:prstGeom prst="rect">
+            <a:avLst/>
+          </a:prstGeom>
+        </p:spPr>
+      </p:pic>
+      <p:pic>
+        <p:nvPicPr>
+          <p:cNvPr id="6" name="Picture 5"/>
+          <p:cNvPicPr>
+            <a:picLocks noChangeAspect="1"/>
+          </p:cNvPicPr>
+          <p:nvPr/>
+        </p:nvPicPr>
+        <p:blipFill>
+          <a:blip r:embed="rId5"/>
+          <a:stretch>
+            <a:fillRect/>
+          </a:stretch>
+        </p:blipFill>
+        <p:spPr>
+          <a:xfrm>
+            <a:off x="10905499" y="40178"/>
+            <a:ext cx="1219306" cy="1042506"/>
+          </a:xfrm>
+          <a:prstGeom prst="rect">
+            <a:avLst/>
+          </a:prstGeom>
+        </p:spPr>
+      </p:pic>
+      <p:pic>
+        <p:nvPicPr>
+          <p:cNvPr id="7" name="Picture 6"/>
+          <p:cNvPicPr>
+            <a:picLocks noChangeAspect="1"/>
+          </p:cNvPicPr>
+          <p:nvPr/>
+        </p:nvPicPr>
+        <p:blipFill>
+          <a:blip r:embed="rId5"/>
+          <a:stretch>
+            <a:fillRect/>
+          </a:stretch>
+        </p:blipFill>
+        <p:spPr>
+          <a:xfrm>
+            <a:off x="0" y="5747928"/>
+            <a:ext cx="1219306" cy="1042506"/>
+          </a:xfrm>
+          <a:prstGeom prst="rect">
+            <a:avLst/>
+          </a:prstGeom>
+        </p:spPr>
+      </p:pic>
+      <p:sp>
+        <p:nvSpPr>
+          <p:cNvPr id="8" name="TextBox 7"/>
+          <p:cNvSpPr txBox="1"/>
+          <p:nvPr/>
+        </p:nvSpPr>
+        <p:spPr>
+          <a:xfrm>
+            <a:off x="3222702" y="288831"/>
+            <a:ext cx="7425520" cy="6463308"/>
+          </a:xfrm>
+          <a:prstGeom prst="rect">
+            <a:avLst/>
+          </a:prstGeom>
+          <a:noFill/>
+        </p:spPr>
+        <p:txBody>
+          <a:bodyPr wrap="square" rtlCol="0">
+            <a:spAutoFit/>
           </a:bodyPr>
           <a:lstStyle/>
           <a:p>
+            <a:r>
+              <a:rPr lang="en-US" dirty="0"/>
+              <a:t>Chicago violent crime rates have been in the news lately and none of these news were good. Both national and local news outlets have published numerous articles highlighting the alarmingly high numbers of violent crimes in the city. </a:t>
+            </a:r>
+            <a:br>
+              <a:rPr lang="en-US" dirty="0"/>
+            </a:br>
+            <a:r>
+              <a:rPr lang="en-US" dirty="0"/>
+              <a:t>In preparation to the upcoming meeting with a very well-known real estate developer, I will to provide honest, unbiased assessment of Chicago crime rates. This is my opportunity to tell how dangerous (or not) Chicago has become in the last year. You </a:t>
+            </a:r>
+            <a:r>
+              <a:rPr lang="en-US" b="1" dirty="0"/>
+              <a:t>may </a:t>
+            </a:r>
+            <a:r>
+              <a:rPr lang="en-US" dirty="0"/>
+              <a:t>want to consider highlighting </a:t>
+            </a:r>
+            <a:r>
+              <a:rPr lang="en-US" b="1" dirty="0"/>
+              <a:t>some </a:t>
+            </a:r>
+            <a:r>
+              <a:rPr lang="en-US" dirty="0"/>
+              <a:t>of the following: </a:t>
+            </a:r>
+            <a:br>
+              <a:rPr lang="en-US" dirty="0"/>
+            </a:br>
+            <a:r>
+              <a:rPr lang="en-US" dirty="0"/>
+              <a:t/>
+            </a:r>
+            <a:br>
+              <a:rPr lang="en-US" dirty="0"/>
+            </a:br>
+            <a:r>
+              <a:rPr lang="en-US" sz="2800" b="1" i="1" dirty="0"/>
+              <a:t>The Problem</a:t>
+            </a:r>
+            <a:r>
+              <a:rPr lang="en-US" sz="2800" b="1" dirty="0"/>
+              <a:t>:</a:t>
+            </a:r>
+            <a:r>
+              <a:rPr lang="en-US" sz="1600" dirty="0"/>
+              <a:t> </a:t>
+            </a:r>
+            <a:r>
+              <a:rPr lang="en-US" dirty="0"/>
+              <a:t/>
+            </a:r>
+            <a:br>
+              <a:rPr lang="en-US" dirty="0"/>
+            </a:br>
+            <a:r>
+              <a:rPr lang="en-US" dirty="0"/>
+              <a:t>• </a:t>
+            </a:r>
+            <a:r>
+              <a:rPr lang="en-US" sz="2400" b="1" dirty="0"/>
+              <a:t>What are the historical Chicago crime trends? </a:t>
+            </a:r>
+            <a:r>
+              <a:rPr lang="en-US" dirty="0"/>
+              <a:t/>
+            </a:r>
+            <a:br>
+              <a:rPr lang="en-US" dirty="0"/>
+            </a:br>
+            <a:r>
+              <a:rPr lang="en-US" dirty="0"/>
+              <a:t/>
+            </a:r>
+            <a:br>
+              <a:rPr lang="en-US" dirty="0"/>
+            </a:br>
+            <a:r>
+              <a:rPr lang="en-US" dirty="0"/>
+              <a:t>o How these trends compare with other large cities? </a:t>
+            </a:r>
+            <a:br>
+              <a:rPr lang="en-US" dirty="0"/>
+            </a:br>
+            <a:r>
+              <a:rPr lang="en-US" dirty="0"/>
+              <a:t>o Is there a seasonality aspect in the crime rates? </a:t>
+            </a:r>
+            <a:br>
+              <a:rPr lang="en-US" dirty="0"/>
+            </a:br>
+            <a:r>
+              <a:rPr lang="en-US" dirty="0"/>
+              <a:t>o Are there certain seasons / times of the day that are particularly affected? </a:t>
+            </a:r>
+            <a:br>
+              <a:rPr lang="en-US" dirty="0"/>
+            </a:br>
+            <a:r>
+              <a:rPr lang="en-US" dirty="0"/>
+              <a:t>o Do you see all crime rates growing in Chicago, or just certain types of crime? </a:t>
+            </a:r>
+            <a:br>
+              <a:rPr lang="en-US" dirty="0"/>
+            </a:br>
+            <a:r>
+              <a:rPr lang="en-US" dirty="0"/>
+              <a:t/>
+            </a:r>
+            <a:br>
+              <a:rPr lang="en-US" dirty="0"/>
+            </a:br>
+            <a:r>
+              <a:rPr lang="en-US" sz="1600" b="1" i="1" dirty="0"/>
+              <a:t> </a:t>
+            </a:r>
+            <a:r>
+              <a:rPr lang="en-US" sz="2800" b="1" i="1" dirty="0"/>
+              <a:t>Hypotheses</a:t>
+            </a:r>
+            <a:r>
+              <a:rPr lang="en-US" sz="2800" dirty="0"/>
+              <a:t>: The Chicago historical crime trend is positive.</a:t>
+            </a:r>
             <a:endParaRPr lang="en-US" dirty="0"/>
           </a:p>
         </p:txBody>
@@ -3266,20 +3635,13 @@
     </p:spTree>
     <p:extLst>
       <p:ext uri="{BB962C8B-B14F-4D97-AF65-F5344CB8AC3E}">
-        <p14:creationId xmlns:p14="http://schemas.microsoft.com/office/powerpoint/2010/main" val="1882196795"/>
+        <p14:creationId xmlns:p14="http://schemas.microsoft.com/office/powerpoint/2010/main" val="1553846014"/>
       </p:ext>
     </p:extLst>
   </p:cSld>
   <p:clrMapOvr>
     <a:masterClrMapping/>
   </p:clrMapOvr>
-  <p:timing>
-    <p:tnLst>
-      <p:par>
-        <p:cTn id="1" dur="indefinite" restart="never" nodeType="tmRoot"/>
-      </p:par>
-    </p:tnLst>
-  </p:timing>
 </p:sld>
 </file>
 
@@ -3375,15 +3737,7 @@
             </a:r>
             <a:r>
               <a:rPr lang="en-US" dirty="0" smtClean="0"/>
-              <a:t>Chicago crime rates is </a:t>
-            </a:r>
-            <a:r>
-              <a:rPr lang="en-US" dirty="0" smtClean="0"/>
-              <a:t>higher than crime rate</a:t>
-            </a:r>
-            <a:r>
-              <a:rPr lang="en-US" dirty="0" smtClean="0"/>
-              <a:t> between major US cities.</a:t>
+              <a:t>Chicago crime rates is higher than crime rate between major US cities.</a:t>
             </a:r>
             <a:endParaRPr lang="en-US" sz="2400" dirty="0"/>
           </a:p>
@@ -3468,15 +3822,7 @@
             </a:r>
             <a:r>
               <a:rPr lang="en-US" dirty="0" smtClean="0"/>
-              <a:t>:  What is </a:t>
-            </a:r>
-            <a:r>
-              <a:rPr lang="en-US" dirty="0" smtClean="0"/>
-              <a:t>Primary Type </a:t>
-            </a:r>
-            <a:r>
-              <a:rPr lang="en-US" dirty="0" smtClean="0"/>
-              <a:t>Chicago crime?</a:t>
+              <a:t>:  What is Primary Type Chicago crime?</a:t>
             </a:r>
           </a:p>
           <a:p>
@@ -4145,4 +4491,265 @@
     </a:ext>
   </a:extLst>
 </a:theme>
+</file>
+
+<file path=ppt/theme/theme2.xml><?xml version="1.0" encoding="utf-8"?>
+<a:theme xmlns:a="http://schemas.openxmlformats.org/drawingml/2006/main" name="Office Theme">
+  <a:themeElements>
+    <a:clrScheme name="Office">
+      <a:dk1>
+        <a:sysClr val="windowText" lastClr="000000"/>
+      </a:dk1>
+      <a:lt1>
+        <a:sysClr val="window" lastClr="FFFFFF"/>
+      </a:lt1>
+      <a:dk2>
+        <a:srgbClr val="44546A"/>
+      </a:dk2>
+      <a:lt2>
+        <a:srgbClr val="E7E6E6"/>
+      </a:lt2>
+      <a:accent1>
+        <a:srgbClr val="4472C4"/>
+      </a:accent1>
+      <a:accent2>
+        <a:srgbClr val="ED7D31"/>
+      </a:accent2>
+      <a:accent3>
+        <a:srgbClr val="A5A5A5"/>
+      </a:accent3>
+      <a:accent4>
+        <a:srgbClr val="FFC000"/>
+      </a:accent4>
+      <a:accent5>
+        <a:srgbClr val="5B9BD5"/>
+      </a:accent5>
+      <a:accent6>
+        <a:srgbClr val="70AD47"/>
+      </a:accent6>
+      <a:hlink>
+        <a:srgbClr val="0563C1"/>
+      </a:hlink>
+      <a:folHlink>
+        <a:srgbClr val="954F72"/>
+      </a:folHlink>
+    </a:clrScheme>
+    <a:fontScheme name="Office">
+      <a:majorFont>
+        <a:latin typeface="Calibri Light" panose="020F0302020204030204"/>
+        <a:ea typeface=""/>
+        <a:cs typeface=""/>
+        <a:font script="Jpan" typeface="Yu Gothic Light"/>
+        <a:font script="Hang" typeface="맑은 고딕"/>
+        <a:font script="Hans" typeface="DengXian Light"/>
+        <a:font script="Hant" typeface="新細明體"/>
+        <a:font script="Arab" typeface="Times New Roman"/>
+        <a:font script="Hebr" typeface="Times New Roman"/>
+        <a:font script="Thai" typeface="Angsana New"/>
+        <a:font script="Ethi" typeface="Nyala"/>
+        <a:font script="Beng" typeface="Vrinda"/>
+        <a:font script="Gujr" typeface="Shruti"/>
+        <a:font script="Khmr" typeface="MoolBoran"/>
+        <a:font script="Knda" typeface="Tunga"/>
+        <a:font script="Guru" typeface="Raavi"/>
+        <a:font script="Cans" typeface="Euphemia"/>
+        <a:font script="Cher" typeface="Plantagenet Cherokee"/>
+        <a:font script="Yiii" typeface="Microsoft Yi Baiti"/>
+        <a:font script="Tibt" typeface="Microsoft Himalaya"/>
+        <a:font script="Thaa" typeface="MV Boli"/>
+        <a:font script="Deva" typeface="Mangal"/>
+        <a:font script="Telu" typeface="Gautami"/>
+        <a:font script="Taml" typeface="Latha"/>
+        <a:font script="Syrc" typeface="Estrangelo Edessa"/>
+        <a:font script="Orya" typeface="Kalinga"/>
+        <a:font script="Mlym" typeface="Kartika"/>
+        <a:font script="Laoo" typeface="DokChampa"/>
+        <a:font script="Sinh" typeface="Iskoola Pota"/>
+        <a:font script="Mong" typeface="Mongolian Baiti"/>
+        <a:font script="Viet" typeface="Times New Roman"/>
+        <a:font script="Uigh" typeface="Microsoft Uighur"/>
+        <a:font script="Geor" typeface="Sylfaen"/>
+      </a:majorFont>
+      <a:minorFont>
+        <a:latin typeface="Calibri" panose="020F0502020204030204"/>
+        <a:ea typeface=""/>
+        <a:cs typeface=""/>
+        <a:font script="Jpan" typeface="Yu Gothic"/>
+        <a:font script="Hang" typeface="맑은 고딕"/>
+        <a:font script="Hans" typeface="DengXian"/>
+        <a:font script="Hant" typeface="新細明體"/>
+        <a:font script="Arab" typeface="Arial"/>
+        <a:font script="Hebr" typeface="Arial"/>
+        <a:font script="Thai" typeface="Cordia New"/>
+        <a:font script="Ethi" typeface="Nyala"/>
+        <a:font script="Beng" typeface="Vrinda"/>
+        <a:font script="Gujr" typeface="Shruti"/>
+        <a:font script="Khmr" typeface="DaunPenh"/>
+        <a:font script="Knda" typeface="Tunga"/>
+        <a:font script="Guru" typeface="Raavi"/>
+        <a:font script="Cans" typeface="Euphemia"/>
+        <a:font script="Cher" typeface="Plantagenet Cherokee"/>
+        <a:font script="Yiii" typeface="Microsoft Yi Baiti"/>
+        <a:font script="Tibt" typeface="Microsoft Himalaya"/>
+        <a:font script="Thaa" typeface="MV Boli"/>
+        <a:font script="Deva" typeface="Mangal"/>
+        <a:font script="Telu" typeface="Gautami"/>
+        <a:font script="Taml" typeface="Latha"/>
+        <a:font script="Syrc" typeface="Estrangelo Edessa"/>
+        <a:font script="Orya" typeface="Kalinga"/>
+        <a:font script="Mlym" typeface="Kartika"/>
+        <a:font script="Laoo" typeface="DokChampa"/>
+        <a:font script="Sinh" typeface="Iskoola Pota"/>
+        <a:font script="Mong" typeface="Mongolian Baiti"/>
+        <a:font script="Viet" typeface="Arial"/>
+        <a:font script="Uigh" typeface="Microsoft Uighur"/>
+        <a:font script="Geor" typeface="Sylfaen"/>
+      </a:minorFont>
+    </a:fontScheme>
+    <a:fmtScheme name="Office">
+      <a:fillStyleLst>
+        <a:solidFill>
+          <a:schemeClr val="phClr"/>
+        </a:solidFill>
+        <a:gradFill rotWithShape="1">
+          <a:gsLst>
+            <a:gs pos="0">
+              <a:schemeClr val="phClr">
+                <a:lumMod val="110000"/>
+                <a:satMod val="105000"/>
+                <a:tint val="67000"/>
+              </a:schemeClr>
+            </a:gs>
+            <a:gs pos="50000">
+              <a:schemeClr val="phClr">
+                <a:lumMod val="105000"/>
+                <a:satMod val="103000"/>
+                <a:tint val="73000"/>
+              </a:schemeClr>
+            </a:gs>
+            <a:gs pos="100000">
+              <a:schemeClr val="phClr">
+                <a:lumMod val="105000"/>
+                <a:satMod val="109000"/>
+                <a:tint val="81000"/>
+              </a:schemeClr>
+            </a:gs>
+          </a:gsLst>
+          <a:lin ang="5400000" scaled="0"/>
+        </a:gradFill>
+        <a:gradFill rotWithShape="1">
+          <a:gsLst>
+            <a:gs pos="0">
+              <a:schemeClr val="phClr">
+                <a:satMod val="103000"/>
+                <a:lumMod val="102000"/>
+                <a:tint val="94000"/>
+              </a:schemeClr>
+            </a:gs>
+            <a:gs pos="50000">
+              <a:schemeClr val="phClr">
+                <a:satMod val="110000"/>
+                <a:lumMod val="100000"/>
+                <a:shade val="100000"/>
+              </a:schemeClr>
+            </a:gs>
+            <a:gs pos="100000">
+              <a:schemeClr val="phClr">
+                <a:lumMod val="99000"/>
+                <a:satMod val="120000"/>
+                <a:shade val="78000"/>
+              </a:schemeClr>
+            </a:gs>
+          </a:gsLst>
+          <a:lin ang="5400000" scaled="0"/>
+        </a:gradFill>
+      </a:fillStyleLst>
+      <a:lnStyleLst>
+        <a:ln w="6350" cap="flat" cmpd="sng" algn="ctr">
+          <a:solidFill>
+            <a:schemeClr val="phClr"/>
+          </a:solidFill>
+          <a:prstDash val="solid"/>
+          <a:miter lim="800000"/>
+        </a:ln>
+        <a:ln w="12700" cap="flat" cmpd="sng" algn="ctr">
+          <a:solidFill>
+            <a:schemeClr val="phClr"/>
+          </a:solidFill>
+          <a:prstDash val="solid"/>
+          <a:miter lim="800000"/>
+        </a:ln>
+        <a:ln w="19050" cap="flat" cmpd="sng" algn="ctr">
+          <a:solidFill>
+            <a:schemeClr val="phClr"/>
+          </a:solidFill>
+          <a:prstDash val="solid"/>
+          <a:miter lim="800000"/>
+        </a:ln>
+      </a:lnStyleLst>
+      <a:effectStyleLst>
+        <a:effectStyle>
+          <a:effectLst/>
+        </a:effectStyle>
+        <a:effectStyle>
+          <a:effectLst/>
+        </a:effectStyle>
+        <a:effectStyle>
+          <a:effectLst>
+            <a:outerShdw blurRad="57150" dist="19050" dir="5400000" algn="ctr" rotWithShape="0">
+              <a:srgbClr val="000000">
+                <a:alpha val="63000"/>
+              </a:srgbClr>
+            </a:outerShdw>
+          </a:effectLst>
+        </a:effectStyle>
+      </a:effectStyleLst>
+      <a:bgFillStyleLst>
+        <a:solidFill>
+          <a:schemeClr val="phClr"/>
+        </a:solidFill>
+        <a:solidFill>
+          <a:schemeClr val="phClr">
+            <a:tint val="95000"/>
+            <a:satMod val="170000"/>
+          </a:schemeClr>
+        </a:solidFill>
+        <a:gradFill rotWithShape="1">
+          <a:gsLst>
+            <a:gs pos="0">
+              <a:schemeClr val="phClr">
+                <a:tint val="93000"/>
+                <a:satMod val="150000"/>
+                <a:shade val="98000"/>
+                <a:lumMod val="102000"/>
+              </a:schemeClr>
+            </a:gs>
+            <a:gs pos="50000">
+              <a:schemeClr val="phClr">
+                <a:tint val="98000"/>
+                <a:satMod val="130000"/>
+                <a:shade val="90000"/>
+                <a:lumMod val="103000"/>
+              </a:schemeClr>
+            </a:gs>
+            <a:gs pos="100000">
+              <a:schemeClr val="phClr">
+                <a:shade val="63000"/>
+                <a:satMod val="120000"/>
+              </a:schemeClr>
+            </a:gs>
+          </a:gsLst>
+          <a:lin ang="5400000" scaled="0"/>
+        </a:gradFill>
+      </a:bgFillStyleLst>
+    </a:fmtScheme>
+  </a:themeElements>
+  <a:objectDefaults/>
+  <a:extraClrSchemeLst/>
+  <a:extLst>
+    <a:ext uri="{05A4C25C-085E-4340-85A3-A5531E510DB2}">
+      <thm15:themeFamily xmlns:thm15="http://schemas.microsoft.com/office/thememl/2012/main" name="Office Theme" id="{62F939B6-93AF-4DB8-9C6B-D6C7DFDC589F}" vid="{4A3C46E8-61CC-4603-A589-7422A47A8E4A}"/>
+    </a:ext>
+  </a:extLst>
+</a:theme>
 </file>
</xml_diff>